<commit_message>
added ppt report and final notebook
</commit_message>
<xml_diff>
--- a/Presentation.pptx
+++ b/Presentation.pptx
@@ -13962,7 +13962,7 @@
         <p:spPr>
           <a:xfrm>
             <a:off x="1524000" y="4376036"/>
-            <a:ext cx="9144000" cy="1384995"/>
+            <a:ext cx="9144000" cy="1446550"/>
           </a:xfrm>
         </p:spPr>
         <p:txBody>
@@ -13972,12 +13972,14 @@
           <a:lstStyle/>
           <a:p>
             <a:r>
-              <a:rPr lang="en-US" b="1" dirty="0">
+              <a:rPr lang="en-US" b="0" i="0" dirty="0">
                 <a:solidFill>
-                  <a:schemeClr val="bg1"/>
+                  <a:srgbClr val="1F1F1F"/>
                 </a:solidFill>
+                <a:effectLst/>
+                <a:latin typeface="OpenSans"/>
               </a:rPr>
-              <a:t>Project Analysis</a:t>
+              <a:t>The Battle of Neighborhoods</a:t>
             </a:r>
             <a:br>
               <a:rPr lang="en-US" dirty="0">
@@ -15350,41 +15352,6 @@
           </p:txBody>
         </p:sp>
       </p:grpSp>
-      <p:pic>
-        <p:nvPicPr>
-          <p:cNvPr id="10" name="Picture 9" descr="This image is an icon that says &quot;24Slides.&quot;">
-            <a:hlinkClick r:id="rId3"/>
-            <a:extLst>
-              <a:ext uri="{FF2B5EF4-FFF2-40B4-BE49-F238E27FC236}">
-                <a16:creationId xmlns:a16="http://schemas.microsoft.com/office/drawing/2014/main" id="{D7D6377A-A12B-4809-B24A-008F2A7B6DE7}"/>
-              </a:ext>
-              <a:ext uri="{C183D7F6-B498-43B3-948B-1728B52AA6E4}">
-                <adec:decorative xmlns:adec="http://schemas.microsoft.com/office/drawing/2017/decorative" val="0"/>
-              </a:ext>
-            </a:extLst>
-          </p:cNvPr>
-          <p:cNvPicPr>
-            <a:picLocks noChangeAspect="1"/>
-          </p:cNvPicPr>
-          <p:nvPr/>
-        </p:nvPicPr>
-        <p:blipFill>
-          <a:blip r:embed="rId4"/>
-          <a:stretch>
-            <a:fillRect/>
-          </a:stretch>
-        </p:blipFill>
-        <p:spPr>
-          <a:xfrm>
-            <a:off x="5360332" y="5919419"/>
-            <a:ext cx="1471335" cy="420363"/>
-          </a:xfrm>
-          <a:prstGeom prst="rect">
-            <a:avLst/>
-          </a:prstGeom>
-          <a:effectLst/>
-        </p:spPr>
-      </p:pic>
     </p:spTree>
     <p:extLst>
       <p:ext uri="{BB962C8B-B14F-4D97-AF65-F5344CB8AC3E}">
@@ -16955,23 +16922,6 @@
 </file>
 
 <file path=customXml/item1.xml><?xml version="1.0" encoding="utf-8"?>
-<p:properties xmlns:p="http://schemas.microsoft.com/office/2006/metadata/properties" xmlns:xsi="http://www.w3.org/2001/XMLSchema-instance" xmlns:pc="http://schemas.microsoft.com/office/infopath/2007/PartnerControls">
-  <documentManagement>
-    <MediaServiceKeyPoints xmlns="71af3243-3dd4-4a8d-8c0d-dd76da1f02a5" xsi:nil="true"/>
-  </documentManagement>
-</p:properties>
-</file>
-
-<file path=customXml/item2.xml><?xml version="1.0" encoding="utf-8"?>
-<?mso-contentType ?>
-<FormTemplates xmlns="http://schemas.microsoft.com/sharepoint/v3/contenttype/forms">
-  <Display>DocumentLibraryForm</Display>
-  <Edit>DocumentLibraryForm</Edit>
-  <New>DocumentLibraryForm</New>
-</FormTemplates>
-</file>
-
-<file path=customXml/item3.xml><?xml version="1.0" encoding="utf-8"?>
 <ct:contentTypeSchema xmlns:ct="http://schemas.microsoft.com/office/2006/metadata/contentType" xmlns:ma="http://schemas.microsoft.com/office/2006/metadata/properties/metaAttributes" ct:_="" ma:_="" ma:contentTypeName="Document" ma:contentTypeID="0x01010079F111ED35F8CC479449609E8A0923A6" ma:contentTypeVersion="11" ma:contentTypeDescription="Create a new document." ma:contentTypeScope="" ma:versionID="9677210f24a1be23c92c90fd886aa0aa">
   <xsd:schema xmlns:xsd="http://www.w3.org/2001/XMLSchema" xmlns:xs="http://www.w3.org/2001/XMLSchema" xmlns:p="http://schemas.microsoft.com/office/2006/metadata/properties" xmlns:ns2="71af3243-3dd4-4a8d-8c0d-dd76da1f02a5" xmlns:ns3="16c05727-aa75-4e4a-9b5f-8a80a1165891" targetNamespace="http://schemas.microsoft.com/office/2006/metadata/properties" ma:root="true" ma:fieldsID="60e05723c5c1908df1a1a4ebf11d344e" ns2:_="" ns3:_="">
     <xsd:import namespace="71af3243-3dd4-4a8d-8c0d-dd76da1f02a5"/>
@@ -17182,32 +17132,24 @@
 </ct:contentTypeSchema>
 </file>
 
-<file path=customXml/itemProps1.xml><?xml version="1.0" encoding="utf-8"?>
-<ds:datastoreItem xmlns:ds="http://schemas.openxmlformats.org/officeDocument/2006/customXml" ds:itemID="{EF609EDA-869E-4BE5-AE5D-B898C584B6FF}">
-  <ds:schemaRefs>
-    <ds:schemaRef ds:uri="http://schemas.microsoft.com/office/2006/documentManagement/types"/>
-    <ds:schemaRef ds:uri="http://purl.org/dc/terms/"/>
-    <ds:schemaRef ds:uri="http://schemas.microsoft.com/office/infopath/2007/PartnerControls"/>
-    <ds:schemaRef ds:uri="http://schemas.openxmlformats.org/package/2006/metadata/core-properties"/>
-    <ds:schemaRef ds:uri="16c05727-aa75-4e4a-9b5f-8a80a1165891"/>
-    <ds:schemaRef ds:uri="http://purl.org/dc/dcmitype/"/>
-    <ds:schemaRef ds:uri="http://purl.org/dc/elements/1.1/"/>
-    <ds:schemaRef ds:uri="71af3243-3dd4-4a8d-8c0d-dd76da1f02a5"/>
-    <ds:schemaRef ds:uri="http://schemas.microsoft.com/office/2006/metadata/properties"/>
-    <ds:schemaRef ds:uri="http://www.w3.org/XML/1998/namespace"/>
-  </ds:schemaRefs>
-</ds:datastoreItem>
+<file path=customXml/item2.xml><?xml version="1.0" encoding="utf-8"?>
+<?mso-contentType ?>
+<FormTemplates xmlns="http://schemas.microsoft.com/sharepoint/v3/contenttype/forms">
+  <Display>DocumentLibraryForm</Display>
+  <Edit>DocumentLibraryForm</Edit>
+  <New>DocumentLibraryForm</New>
+</FormTemplates>
 </file>
 
-<file path=customXml/itemProps2.xml><?xml version="1.0" encoding="utf-8"?>
-<ds:datastoreItem xmlns:ds="http://schemas.openxmlformats.org/officeDocument/2006/customXml" ds:itemID="{2FD05317-60D6-4B3A-8545-888496D1A8EC}">
-  <ds:schemaRefs>
-    <ds:schemaRef ds:uri="http://schemas.microsoft.com/sharepoint/v3/contenttype/forms"/>
-  </ds:schemaRefs>
-</ds:datastoreItem>
+<file path=customXml/item3.xml><?xml version="1.0" encoding="utf-8"?>
+<p:properties xmlns:p="http://schemas.microsoft.com/office/2006/metadata/properties" xmlns:xsi="http://www.w3.org/2001/XMLSchema-instance" xmlns:pc="http://schemas.microsoft.com/office/infopath/2007/PartnerControls">
+  <documentManagement>
+    <MediaServiceKeyPoints xmlns="71af3243-3dd4-4a8d-8c0d-dd76da1f02a5" xsi:nil="true"/>
+  </documentManagement>
+</p:properties>
 </file>
 
-<file path=customXml/itemProps3.xml><?xml version="1.0" encoding="utf-8"?>
+<file path=customXml/itemProps1.xml><?xml version="1.0" encoding="utf-8"?>
 <ds:datastoreItem xmlns:ds="http://schemas.openxmlformats.org/officeDocument/2006/customXml" ds:itemID="{61A00BBF-EEBB-4E18-B8CB-F926EAAC48F7}">
   <ds:schemaRefs>
     <ds:schemaRef ds:uri="http://schemas.microsoft.com/office/2006/metadata/contentType"/>
@@ -17224,4 +17166,29 @@
     <ds:schemaRef ds:uri="http://schemas.microsoft.com/internal/obd"/>
   </ds:schemaRefs>
 </ds:datastoreItem>
+</file>
+
+<file path=customXml/itemProps2.xml><?xml version="1.0" encoding="utf-8"?>
+<ds:datastoreItem xmlns:ds="http://schemas.openxmlformats.org/officeDocument/2006/customXml" ds:itemID="{2FD05317-60D6-4B3A-8545-888496D1A8EC}">
+  <ds:schemaRefs>
+    <ds:schemaRef ds:uri="http://schemas.microsoft.com/sharepoint/v3/contenttype/forms"/>
+  </ds:schemaRefs>
+</ds:datastoreItem>
+</file>
+
+<file path=customXml/itemProps3.xml><?xml version="1.0" encoding="utf-8"?>
+<ds:datastoreItem xmlns:ds="http://schemas.openxmlformats.org/officeDocument/2006/customXml" ds:itemID="{EF609EDA-869E-4BE5-AE5D-B898C584B6FF}">
+  <ds:schemaRefs>
+    <ds:schemaRef ds:uri="http://schemas.microsoft.com/office/2006/documentManagement/types"/>
+    <ds:schemaRef ds:uri="http://purl.org/dc/terms/"/>
+    <ds:schemaRef ds:uri="http://schemas.microsoft.com/office/infopath/2007/PartnerControls"/>
+    <ds:schemaRef ds:uri="http://schemas.openxmlformats.org/package/2006/metadata/core-properties"/>
+    <ds:schemaRef ds:uri="16c05727-aa75-4e4a-9b5f-8a80a1165891"/>
+    <ds:schemaRef ds:uri="http://purl.org/dc/dcmitype/"/>
+    <ds:schemaRef ds:uri="http://purl.org/dc/elements/1.1/"/>
+    <ds:schemaRef ds:uri="71af3243-3dd4-4a8d-8c0d-dd76da1f02a5"/>
+    <ds:schemaRef ds:uri="http://schemas.microsoft.com/office/2006/metadata/properties"/>
+    <ds:schemaRef ds:uri="http://www.w3.org/XML/1998/namespace"/>
+  </ds:schemaRefs>
+</ds:datastoreItem>
 </file>
</xml_diff>